<commit_message>
Resources Adjusted to Low Resolution
</commit_message>
<xml_diff>
--- a/assets/documentation/AirGlobe Presentation.pptx
+++ b/assets/documentation/AirGlobe Presentation.pptx
@@ -11,9 +11,13 @@
     <p:sldId id="259" r:id="rId5"/>
     <p:sldId id="264" r:id="rId6"/>
     <p:sldId id="260" r:id="rId7"/>
-    <p:sldId id="261" r:id="rId8"/>
-    <p:sldId id="262" r:id="rId9"/>
-    <p:sldId id="265" r:id="rId10"/>
+    <p:sldId id="262" r:id="rId8"/>
+    <p:sldId id="266" r:id="rId9"/>
+    <p:sldId id="267" r:id="rId10"/>
+    <p:sldId id="268" r:id="rId11"/>
+    <p:sldId id="269" r:id="rId12"/>
+    <p:sldId id="270" r:id="rId13"/>
+    <p:sldId id="265" r:id="rId14"/>
   </p:sldIdLst>
   <p:sldSz cx="12192000" cy="6858000"/>
   <p:notesSz cx="6858000" cy="9144000"/>
@@ -344,7 +348,7 @@
           <a:p>
             <a:fld id="{4614ED30-43E0-47A6-AB53-01753448D686}" type="datetimeFigureOut">
               <a:rPr lang="en-PH" smtClean="0"/>
-              <a:t>21/03/2023</a:t>
+              <a:t>28/03/2023</a:t>
             </a:fld>
             <a:endParaRPr lang="en-PH"/>
           </a:p>
@@ -514,7 +518,7 @@
           <a:p>
             <a:fld id="{4614ED30-43E0-47A6-AB53-01753448D686}" type="datetimeFigureOut">
               <a:rPr lang="en-PH" smtClean="0"/>
-              <a:t>21/03/2023</a:t>
+              <a:t>28/03/2023</a:t>
             </a:fld>
             <a:endParaRPr lang="en-PH"/>
           </a:p>
@@ -694,7 +698,7 @@
           <a:p>
             <a:fld id="{4614ED30-43E0-47A6-AB53-01753448D686}" type="datetimeFigureOut">
               <a:rPr lang="en-PH" smtClean="0"/>
-              <a:t>21/03/2023</a:t>
+              <a:t>28/03/2023</a:t>
             </a:fld>
             <a:endParaRPr lang="en-PH"/>
           </a:p>
@@ -864,7 +868,7 @@
           <a:p>
             <a:fld id="{4614ED30-43E0-47A6-AB53-01753448D686}" type="datetimeFigureOut">
               <a:rPr lang="en-PH" smtClean="0"/>
-              <a:t>21/03/2023</a:t>
+              <a:t>28/03/2023</a:t>
             </a:fld>
             <a:endParaRPr lang="en-PH"/>
           </a:p>
@@ -1122,7 +1126,7 @@
           <a:p>
             <a:fld id="{4614ED30-43E0-47A6-AB53-01753448D686}" type="datetimeFigureOut">
               <a:rPr lang="en-PH" smtClean="0"/>
-              <a:t>21/03/2023</a:t>
+              <a:t>28/03/2023</a:t>
             </a:fld>
             <a:endParaRPr lang="en-PH"/>
           </a:p>
@@ -1410,7 +1414,7 @@
           <a:p>
             <a:fld id="{4614ED30-43E0-47A6-AB53-01753448D686}" type="datetimeFigureOut">
               <a:rPr lang="en-PH" smtClean="0"/>
-              <a:t>21/03/2023</a:t>
+              <a:t>28/03/2023</a:t>
             </a:fld>
             <a:endParaRPr lang="en-PH"/>
           </a:p>
@@ -1852,7 +1856,7 @@
           <a:p>
             <a:fld id="{4614ED30-43E0-47A6-AB53-01753448D686}" type="datetimeFigureOut">
               <a:rPr lang="en-PH" smtClean="0"/>
-              <a:t>21/03/2023</a:t>
+              <a:t>28/03/2023</a:t>
             </a:fld>
             <a:endParaRPr lang="en-PH"/>
           </a:p>
@@ -1970,7 +1974,7 @@
           <a:p>
             <a:fld id="{4614ED30-43E0-47A6-AB53-01753448D686}" type="datetimeFigureOut">
               <a:rPr lang="en-PH" smtClean="0"/>
-              <a:t>21/03/2023</a:t>
+              <a:t>28/03/2023</a:t>
             </a:fld>
             <a:endParaRPr lang="en-PH"/>
           </a:p>
@@ -2065,7 +2069,7 @@
           <a:p>
             <a:fld id="{4614ED30-43E0-47A6-AB53-01753448D686}" type="datetimeFigureOut">
               <a:rPr lang="en-PH" smtClean="0"/>
-              <a:t>21/03/2023</a:t>
+              <a:t>28/03/2023</a:t>
             </a:fld>
             <a:endParaRPr lang="en-PH"/>
           </a:p>
@@ -2353,7 +2357,7 @@
           <a:p>
             <a:fld id="{4614ED30-43E0-47A6-AB53-01753448D686}" type="datetimeFigureOut">
               <a:rPr lang="en-PH" smtClean="0"/>
-              <a:t>21/03/2023</a:t>
+              <a:t>28/03/2023</a:t>
             </a:fld>
             <a:endParaRPr lang="en-PH"/>
           </a:p>
@@ -2626,7 +2630,7 @@
           <a:p>
             <a:fld id="{4614ED30-43E0-47A6-AB53-01753448D686}" type="datetimeFigureOut">
               <a:rPr lang="en-PH" smtClean="0"/>
-              <a:t>21/03/2023</a:t>
+              <a:t>28/03/2023</a:t>
             </a:fld>
             <a:endParaRPr lang="en-PH"/>
           </a:p>
@@ -2923,7 +2927,7 @@
           <a:p>
             <a:fld id="{4614ED30-43E0-47A6-AB53-01753448D686}" type="datetimeFigureOut">
               <a:rPr lang="en-PH" smtClean="0"/>
-              <a:t>21/03/2023</a:t>
+              <a:t>28/03/2023</a:t>
             </a:fld>
             <a:endParaRPr lang="en-PH"/>
           </a:p>
@@ -3534,6 +3538,525 @@
 </p:sld>
 </file>
 
+<file path=ppt/slides/slide10.xml><?xml version="1.0" encoding="utf-8"?>
+<p:sld xmlns:a="http://schemas.openxmlformats.org/drawingml/2006/main" xmlns:r="http://schemas.openxmlformats.org/officeDocument/2006/relationships" xmlns:p="http://schemas.openxmlformats.org/presentationml/2006/main">
+  <p:cSld>
+    <p:spTree>
+      <p:nvGrpSpPr>
+        <p:cNvPr id="1" name=""/>
+        <p:cNvGrpSpPr/>
+        <p:nvPr/>
+      </p:nvGrpSpPr>
+      <p:grpSpPr>
+        <a:xfrm>
+          <a:off x="0" y="0"/>
+          <a:ext cx="0" cy="0"/>
+          <a:chOff x="0" y="0"/>
+          <a:chExt cx="0" cy="0"/>
+        </a:xfrm>
+      </p:grpSpPr>
+      <p:sp>
+        <p:nvSpPr>
+          <p:cNvPr id="2" name="Title 1">
+            <a:extLst>
+              <a:ext uri="{FF2B5EF4-FFF2-40B4-BE49-F238E27FC236}">
+                <a16:creationId xmlns:a16="http://schemas.microsoft.com/office/drawing/2014/main" id="{C2C86CE1-E895-491C-8B5F-53A5638DD51E}"/>
+              </a:ext>
+            </a:extLst>
+          </p:cNvPr>
+          <p:cNvSpPr>
+            <a:spLocks noGrp="1"/>
+          </p:cNvSpPr>
+          <p:nvPr>
+            <p:ph type="title"/>
+          </p:nvPr>
+        </p:nvSpPr>
+        <p:spPr/>
+        <p:txBody>
+          <a:bodyPr/>
+          <a:lstStyle/>
+          <a:p>
+            <a:r>
+              <a:rPr lang="en-US" dirty="0"/>
+              <a:t>Sign Up Page</a:t>
+            </a:r>
+            <a:endParaRPr lang="en-PH" dirty="0"/>
+          </a:p>
+        </p:txBody>
+      </p:sp>
+      <p:pic>
+        <p:nvPicPr>
+          <p:cNvPr id="6" name="Picture 5">
+            <a:extLst>
+              <a:ext uri="{FF2B5EF4-FFF2-40B4-BE49-F238E27FC236}">
+                <a16:creationId xmlns:a16="http://schemas.microsoft.com/office/drawing/2014/main" id="{5D832449-C2B9-4F73-82D0-1A44B572C71E}"/>
+              </a:ext>
+            </a:extLst>
+          </p:cNvPr>
+          <p:cNvPicPr>
+            <a:picLocks noChangeAspect="1"/>
+          </p:cNvPicPr>
+          <p:nvPr/>
+        </p:nvPicPr>
+        <p:blipFill>
+          <a:blip r:embed="rId2">
+            <a:extLst>
+              <a:ext uri="{28A0092B-C50C-407E-A947-70E740481C1C}">
+                <a14:useLocalDpi xmlns:a14="http://schemas.microsoft.com/office/drawing/2010/main" val="0"/>
+              </a:ext>
+            </a:extLst>
+          </a:blip>
+          <a:stretch>
+            <a:fillRect/>
+          </a:stretch>
+        </p:blipFill>
+        <p:spPr>
+          <a:xfrm>
+            <a:off x="3822700" y="1060873"/>
+            <a:ext cx="6917531" cy="4919133"/>
+          </a:xfrm>
+          <a:prstGeom prst="rect">
+            <a:avLst/>
+          </a:prstGeom>
+          <a:ln>
+            <a:solidFill>
+              <a:schemeClr val="tx2"/>
+            </a:solidFill>
+          </a:ln>
+        </p:spPr>
+      </p:pic>
+    </p:spTree>
+    <p:extLst>
+      <p:ext uri="{BB962C8B-B14F-4D97-AF65-F5344CB8AC3E}">
+        <p14:creationId xmlns:p14="http://schemas.microsoft.com/office/powerpoint/2010/main" val="2012448962"/>
+      </p:ext>
+    </p:extLst>
+  </p:cSld>
+  <p:clrMapOvr>
+    <a:masterClrMapping/>
+  </p:clrMapOvr>
+</p:sld>
+</file>
+
+<file path=ppt/slides/slide11.xml><?xml version="1.0" encoding="utf-8"?>
+<p:sld xmlns:a="http://schemas.openxmlformats.org/drawingml/2006/main" xmlns:r="http://schemas.openxmlformats.org/officeDocument/2006/relationships" xmlns:p="http://schemas.openxmlformats.org/presentationml/2006/main">
+  <p:cSld>
+    <p:spTree>
+      <p:nvGrpSpPr>
+        <p:cNvPr id="1" name=""/>
+        <p:cNvGrpSpPr/>
+        <p:nvPr/>
+      </p:nvGrpSpPr>
+      <p:grpSpPr>
+        <a:xfrm>
+          <a:off x="0" y="0"/>
+          <a:ext cx="0" cy="0"/>
+          <a:chOff x="0" y="0"/>
+          <a:chExt cx="0" cy="0"/>
+        </a:xfrm>
+      </p:grpSpPr>
+      <p:sp>
+        <p:nvSpPr>
+          <p:cNvPr id="2" name="Title 1">
+            <a:extLst>
+              <a:ext uri="{FF2B5EF4-FFF2-40B4-BE49-F238E27FC236}">
+                <a16:creationId xmlns:a16="http://schemas.microsoft.com/office/drawing/2014/main" id="{ABCEBB69-3395-4309-AFFD-19A532D42B8A}"/>
+              </a:ext>
+            </a:extLst>
+          </p:cNvPr>
+          <p:cNvSpPr>
+            <a:spLocks noGrp="1"/>
+          </p:cNvSpPr>
+          <p:nvPr>
+            <p:ph type="title"/>
+          </p:nvPr>
+        </p:nvSpPr>
+        <p:spPr/>
+        <p:txBody>
+          <a:bodyPr/>
+          <a:lstStyle/>
+          <a:p>
+            <a:r>
+              <a:rPr lang="en-US" dirty="0"/>
+              <a:t>Videos</a:t>
+            </a:r>
+            <a:endParaRPr lang="en-PH" dirty="0"/>
+          </a:p>
+        </p:txBody>
+      </p:sp>
+      <p:pic>
+        <p:nvPicPr>
+          <p:cNvPr id="6" name="Picture 5">
+            <a:extLst>
+              <a:ext uri="{FF2B5EF4-FFF2-40B4-BE49-F238E27FC236}">
+                <a16:creationId xmlns:a16="http://schemas.microsoft.com/office/drawing/2014/main" id="{027A894B-8D6C-477E-AF7C-B58B9B0E2208}"/>
+              </a:ext>
+            </a:extLst>
+          </p:cNvPr>
+          <p:cNvPicPr>
+            <a:picLocks noChangeAspect="1"/>
+          </p:cNvPicPr>
+          <p:nvPr/>
+        </p:nvPicPr>
+        <p:blipFill>
+          <a:blip r:embed="rId2">
+            <a:extLst>
+              <a:ext uri="{28A0092B-C50C-407E-A947-70E740481C1C}">
+                <a14:useLocalDpi xmlns:a14="http://schemas.microsoft.com/office/drawing/2010/main" val="0"/>
+              </a:ext>
+            </a:extLst>
+          </a:blip>
+          <a:stretch>
+            <a:fillRect/>
+          </a:stretch>
+        </p:blipFill>
+        <p:spPr>
+          <a:xfrm>
+            <a:off x="4129881" y="1120140"/>
+            <a:ext cx="6343650" cy="4511040"/>
+          </a:xfrm>
+          <a:prstGeom prst="rect">
+            <a:avLst/>
+          </a:prstGeom>
+          <a:ln>
+            <a:solidFill>
+              <a:schemeClr val="tx2"/>
+            </a:solidFill>
+          </a:ln>
+        </p:spPr>
+      </p:pic>
+    </p:spTree>
+    <p:extLst>
+      <p:ext uri="{BB962C8B-B14F-4D97-AF65-F5344CB8AC3E}">
+        <p14:creationId xmlns:p14="http://schemas.microsoft.com/office/powerpoint/2010/main" val="2396344961"/>
+      </p:ext>
+    </p:extLst>
+  </p:cSld>
+  <p:clrMapOvr>
+    <a:masterClrMapping/>
+  </p:clrMapOvr>
+</p:sld>
+</file>
+
+<file path=ppt/slides/slide12.xml><?xml version="1.0" encoding="utf-8"?>
+<p:sld xmlns:a="http://schemas.openxmlformats.org/drawingml/2006/main" xmlns:r="http://schemas.openxmlformats.org/officeDocument/2006/relationships" xmlns:p="http://schemas.openxmlformats.org/presentationml/2006/main">
+  <p:cSld>
+    <p:spTree>
+      <p:nvGrpSpPr>
+        <p:cNvPr id="1" name=""/>
+        <p:cNvGrpSpPr/>
+        <p:nvPr/>
+      </p:nvGrpSpPr>
+      <p:grpSpPr>
+        <a:xfrm>
+          <a:off x="0" y="0"/>
+          <a:ext cx="0" cy="0"/>
+          <a:chOff x="0" y="0"/>
+          <a:chExt cx="0" cy="0"/>
+        </a:xfrm>
+      </p:grpSpPr>
+      <p:sp>
+        <p:nvSpPr>
+          <p:cNvPr id="2" name="Title 1">
+            <a:extLst>
+              <a:ext uri="{FF2B5EF4-FFF2-40B4-BE49-F238E27FC236}">
+                <a16:creationId xmlns:a16="http://schemas.microsoft.com/office/drawing/2014/main" id="{DF8B7694-885C-4F42-ABA9-5B843B65C1BA}"/>
+              </a:ext>
+            </a:extLst>
+          </p:cNvPr>
+          <p:cNvSpPr>
+            <a:spLocks noGrp="1"/>
+          </p:cNvSpPr>
+          <p:nvPr>
+            <p:ph type="title"/>
+          </p:nvPr>
+        </p:nvSpPr>
+        <p:spPr/>
+        <p:txBody>
+          <a:bodyPr/>
+          <a:lstStyle/>
+          <a:p>
+            <a:r>
+              <a:rPr lang="en-US" dirty="0"/>
+              <a:t>Who we are</a:t>
+            </a:r>
+            <a:endParaRPr lang="en-PH" dirty="0"/>
+          </a:p>
+        </p:txBody>
+      </p:sp>
+      <p:pic>
+        <p:nvPicPr>
+          <p:cNvPr id="6" name="Picture 5">
+            <a:extLst>
+              <a:ext uri="{FF2B5EF4-FFF2-40B4-BE49-F238E27FC236}">
+                <a16:creationId xmlns:a16="http://schemas.microsoft.com/office/drawing/2014/main" id="{08452E1E-A60E-455C-B28B-28BF2E8BE78E}"/>
+              </a:ext>
+            </a:extLst>
+          </p:cNvPr>
+          <p:cNvPicPr>
+            <a:picLocks noChangeAspect="1"/>
+          </p:cNvPicPr>
+          <p:nvPr/>
+        </p:nvPicPr>
+        <p:blipFill>
+          <a:blip r:embed="rId2">
+            <a:extLst>
+              <a:ext uri="{28A0092B-C50C-407E-A947-70E740481C1C}">
+                <a14:useLocalDpi xmlns:a14="http://schemas.microsoft.com/office/drawing/2010/main" val="0"/>
+              </a:ext>
+            </a:extLst>
+          </a:blip>
+          <a:stretch>
+            <a:fillRect/>
+          </a:stretch>
+        </p:blipFill>
+        <p:spPr>
+          <a:xfrm>
+            <a:off x="4584308" y="1242339"/>
+            <a:ext cx="6024096" cy="4501338"/>
+          </a:xfrm>
+          <a:prstGeom prst="rect">
+            <a:avLst/>
+          </a:prstGeom>
+          <a:ln>
+            <a:solidFill>
+              <a:schemeClr val="tx2"/>
+            </a:solidFill>
+          </a:ln>
+        </p:spPr>
+      </p:pic>
+    </p:spTree>
+    <p:extLst>
+      <p:ext uri="{BB962C8B-B14F-4D97-AF65-F5344CB8AC3E}">
+        <p14:creationId xmlns:p14="http://schemas.microsoft.com/office/powerpoint/2010/main" val="986512860"/>
+      </p:ext>
+    </p:extLst>
+  </p:cSld>
+  <p:clrMapOvr>
+    <a:masterClrMapping/>
+  </p:clrMapOvr>
+</p:sld>
+</file>
+
+<file path=ppt/slides/slide13.xml><?xml version="1.0" encoding="utf-8"?>
+<p:sld xmlns:a="http://schemas.openxmlformats.org/drawingml/2006/main" xmlns:r="http://schemas.openxmlformats.org/officeDocument/2006/relationships" xmlns:p="http://schemas.openxmlformats.org/presentationml/2006/main">
+  <p:cSld>
+    <p:spTree>
+      <p:nvGrpSpPr>
+        <p:cNvPr id="1" name=""/>
+        <p:cNvGrpSpPr/>
+        <p:nvPr/>
+      </p:nvGrpSpPr>
+      <p:grpSpPr>
+        <a:xfrm>
+          <a:off x="0" y="0"/>
+          <a:ext cx="0" cy="0"/>
+          <a:chOff x="0" y="0"/>
+          <a:chExt cx="0" cy="0"/>
+        </a:xfrm>
+      </p:grpSpPr>
+      <p:sp>
+        <p:nvSpPr>
+          <p:cNvPr id="4" name="Rectangle 3">
+            <a:extLst>
+              <a:ext uri="{FF2B5EF4-FFF2-40B4-BE49-F238E27FC236}">
+                <a16:creationId xmlns:a16="http://schemas.microsoft.com/office/drawing/2014/main" id="{0BBF0F5E-E4C9-42DF-87F1-44A77616CBA4}"/>
+              </a:ext>
+            </a:extLst>
+          </p:cNvPr>
+          <p:cNvSpPr/>
+          <p:nvPr/>
+        </p:nvSpPr>
+        <p:spPr>
+          <a:xfrm>
+            <a:off x="-1" y="0"/>
+            <a:ext cx="1496219" cy="6858000"/>
+          </a:xfrm>
+          <a:prstGeom prst="rect">
+            <a:avLst/>
+          </a:prstGeom>
+          <a:ln>
+            <a:noFill/>
+          </a:ln>
+        </p:spPr>
+        <p:style>
+          <a:lnRef idx="2">
+            <a:schemeClr val="accent1">
+              <a:shade val="50000"/>
+            </a:schemeClr>
+          </a:lnRef>
+          <a:fillRef idx="1">
+            <a:schemeClr val="accent1"/>
+          </a:fillRef>
+          <a:effectRef idx="0">
+            <a:schemeClr val="accent1"/>
+          </a:effectRef>
+          <a:fontRef idx="minor">
+            <a:schemeClr val="lt1"/>
+          </a:fontRef>
+        </p:style>
+        <p:txBody>
+          <a:bodyPr rtlCol="0" anchor="ctr"/>
+          <a:lstStyle/>
+          <a:p>
+            <a:pPr algn="ctr"/>
+            <a:endParaRPr lang="en-PH"/>
+          </a:p>
+        </p:txBody>
+      </p:sp>
+      <p:sp>
+        <p:nvSpPr>
+          <p:cNvPr id="5" name="TextBox 4">
+            <a:extLst>
+              <a:ext uri="{FF2B5EF4-FFF2-40B4-BE49-F238E27FC236}">
+                <a16:creationId xmlns:a16="http://schemas.microsoft.com/office/drawing/2014/main" id="{817B24FD-3015-4D3C-8253-BF3934F7328C}"/>
+              </a:ext>
+            </a:extLst>
+          </p:cNvPr>
+          <p:cNvSpPr txBox="1"/>
+          <p:nvPr/>
+        </p:nvSpPr>
+        <p:spPr>
+          <a:xfrm>
+            <a:off x="194109" y="207059"/>
+            <a:ext cx="1107996" cy="5511800"/>
+          </a:xfrm>
+          <a:prstGeom prst="rect">
+            <a:avLst/>
+          </a:prstGeom>
+          <a:noFill/>
+        </p:spPr>
+        <p:txBody>
+          <a:bodyPr vert="vert270" wrap="square" rtlCol="0">
+            <a:spAutoFit/>
+          </a:bodyPr>
+          <a:lstStyle/>
+          <a:p>
+            <a:pPr algn="ctr"/>
+            <a:r>
+              <a:rPr lang="en-US" sz="6000" b="1" dirty="0">
+                <a:solidFill>
+                  <a:schemeClr val="bg1"/>
+                </a:solidFill>
+              </a:rPr>
+              <a:t>MOOD BOARD</a:t>
+            </a:r>
+            <a:endParaRPr lang="en-PH" sz="6000" b="1" dirty="0">
+              <a:solidFill>
+                <a:schemeClr val="bg1"/>
+              </a:solidFill>
+            </a:endParaRPr>
+          </a:p>
+        </p:txBody>
+      </p:sp>
+      <p:sp>
+        <p:nvSpPr>
+          <p:cNvPr id="6" name="TextBox 5">
+            <a:extLst>
+              <a:ext uri="{FF2B5EF4-FFF2-40B4-BE49-F238E27FC236}">
+                <a16:creationId xmlns:a16="http://schemas.microsoft.com/office/drawing/2014/main" id="{0C45BCC4-FF38-47A1-BEE2-20885A116753}"/>
+              </a:ext>
+            </a:extLst>
+          </p:cNvPr>
+          <p:cNvSpPr txBox="1"/>
+          <p:nvPr/>
+        </p:nvSpPr>
+        <p:spPr>
+          <a:xfrm>
+            <a:off x="-2" y="5925918"/>
+            <a:ext cx="1496219" cy="646331"/>
+          </a:xfrm>
+          <a:prstGeom prst="rect">
+            <a:avLst/>
+          </a:prstGeom>
+          <a:noFill/>
+        </p:spPr>
+        <p:txBody>
+          <a:bodyPr wrap="square" rtlCol="0">
+            <a:spAutoFit/>
+          </a:bodyPr>
+          <a:lstStyle/>
+          <a:p>
+            <a:pPr algn="ctr"/>
+            <a:r>
+              <a:rPr lang="en-US" dirty="0">
+                <a:solidFill>
+                  <a:schemeClr val="bg1"/>
+                </a:solidFill>
+                <a:latin typeface="Franklin Gothic Book" panose="020B0503020102020204" pitchFamily="34" charset="0"/>
+              </a:rPr>
+              <a:t>WEBSITE </a:t>
+            </a:r>
+          </a:p>
+          <a:p>
+            <a:pPr algn="ctr"/>
+            <a:r>
+              <a:rPr lang="en-US" dirty="0">
+                <a:solidFill>
+                  <a:schemeClr val="bg1"/>
+                </a:solidFill>
+                <a:latin typeface="Franklin Gothic Book" panose="020B0503020102020204" pitchFamily="34" charset="0"/>
+              </a:rPr>
+              <a:t>THEME</a:t>
+            </a:r>
+            <a:endParaRPr lang="en-PH" dirty="0">
+              <a:solidFill>
+                <a:schemeClr val="bg1"/>
+              </a:solidFill>
+              <a:latin typeface="Franklin Gothic Book" panose="020B0503020102020204" pitchFamily="34" charset="0"/>
+            </a:endParaRPr>
+          </a:p>
+        </p:txBody>
+      </p:sp>
+      <p:pic>
+        <p:nvPicPr>
+          <p:cNvPr id="7" name="Picture 6">
+            <a:extLst>
+              <a:ext uri="{FF2B5EF4-FFF2-40B4-BE49-F238E27FC236}">
+                <a16:creationId xmlns:a16="http://schemas.microsoft.com/office/drawing/2014/main" id="{43270C70-5A76-4FA8-97C9-03DE73F787E2}"/>
+              </a:ext>
+            </a:extLst>
+          </p:cNvPr>
+          <p:cNvPicPr>
+            <a:picLocks noChangeAspect="1"/>
+          </p:cNvPicPr>
+          <p:nvPr/>
+        </p:nvPicPr>
+        <p:blipFill>
+          <a:blip r:embed="rId2">
+            <a:extLst>
+              <a:ext uri="{28A0092B-C50C-407E-A947-70E740481C1C}">
+                <a14:useLocalDpi xmlns:a14="http://schemas.microsoft.com/office/drawing/2010/main" val="0"/>
+              </a:ext>
+            </a:extLst>
+          </a:blip>
+          <a:stretch>
+            <a:fillRect/>
+          </a:stretch>
+        </p:blipFill>
+        <p:spPr>
+          <a:xfrm>
+            <a:off x="2769365" y="1011018"/>
+            <a:ext cx="8230976" cy="4914900"/>
+          </a:xfrm>
+          <a:prstGeom prst="rect">
+            <a:avLst/>
+          </a:prstGeom>
+        </p:spPr>
+      </p:pic>
+    </p:spTree>
+    <p:extLst>
+      <p:ext uri="{BB962C8B-B14F-4D97-AF65-F5344CB8AC3E}">
+        <p14:creationId xmlns:p14="http://schemas.microsoft.com/office/powerpoint/2010/main" val="3137594366"/>
+      </p:ext>
+    </p:extLst>
+  </p:cSld>
+  <p:clrMapOvr>
+    <a:masterClrMapping/>
+  </p:clrMapOvr>
+</p:sld>
+</file>
+
 <file path=ppt/slides/slide2.xml><?xml version="1.0" encoding="utf-8"?>
 <p:sld xmlns:a="http://schemas.openxmlformats.org/drawingml/2006/main" xmlns:r="http://schemas.openxmlformats.org/officeDocument/2006/relationships" xmlns:p="http://schemas.openxmlformats.org/presentationml/2006/main">
   <p:cSld>
@@ -4248,143 +4771,6 @@
       </p:sp>
       <p:sp>
         <p:nvSpPr>
-          <p:cNvPr id="4" name="Text Placeholder 3">
-            <a:extLst>
-              <a:ext uri="{FF2B5EF4-FFF2-40B4-BE49-F238E27FC236}">
-                <a16:creationId xmlns:a16="http://schemas.microsoft.com/office/drawing/2014/main" id="{DA0FFBD4-CC2D-464E-9719-5C36B1B04673}"/>
-              </a:ext>
-            </a:extLst>
-          </p:cNvPr>
-          <p:cNvSpPr>
-            <a:spLocks noGrp="1"/>
-          </p:cNvSpPr>
-          <p:nvPr>
-            <p:ph type="body" sz="half" idx="2"/>
-          </p:nvPr>
-        </p:nvSpPr>
-        <p:spPr/>
-        <p:txBody>
-          <a:bodyPr/>
-          <a:lstStyle/>
-          <a:p>
-            <a:r>
-              <a:rPr lang="en-US" dirty="0"/>
-              <a:t>Mobile and Desktop View</a:t>
-            </a:r>
-            <a:endParaRPr lang="en-PH" dirty="0"/>
-          </a:p>
-        </p:txBody>
-      </p:sp>
-      <p:pic>
-        <p:nvPicPr>
-          <p:cNvPr id="10" name="Picture 9">
-            <a:extLst>
-              <a:ext uri="{FF2B5EF4-FFF2-40B4-BE49-F238E27FC236}">
-                <a16:creationId xmlns:a16="http://schemas.microsoft.com/office/drawing/2014/main" id="{D44E0141-7483-41F2-84AE-34A2BB0B16C1}"/>
-              </a:ext>
-            </a:extLst>
-          </p:cNvPr>
-          <p:cNvPicPr>
-            <a:picLocks noChangeAspect="1"/>
-          </p:cNvPicPr>
-          <p:nvPr/>
-        </p:nvPicPr>
-        <p:blipFill>
-          <a:blip r:embed="rId2">
-            <a:extLst>
-              <a:ext uri="{28A0092B-C50C-407E-A947-70E740481C1C}">
-                <a14:useLocalDpi xmlns:a14="http://schemas.microsoft.com/office/drawing/2010/main" val="0"/>
-              </a:ext>
-            </a:extLst>
-          </a:blip>
-          <a:stretch>
-            <a:fillRect/>
-          </a:stretch>
-        </p:blipFill>
-        <p:spPr>
-          <a:xfrm>
-            <a:off x="4147058" y="682170"/>
-            <a:ext cx="3149998" cy="5493658"/>
-          </a:xfrm>
-          <a:prstGeom prst="rect">
-            <a:avLst/>
-          </a:prstGeom>
-        </p:spPr>
-      </p:pic>
-      <p:pic>
-        <p:nvPicPr>
-          <p:cNvPr id="14" name="Picture 13">
-            <a:extLst>
-              <a:ext uri="{FF2B5EF4-FFF2-40B4-BE49-F238E27FC236}">
-                <a16:creationId xmlns:a16="http://schemas.microsoft.com/office/drawing/2014/main" id="{FD3874B2-DD7C-46E7-AA78-49DBE9254ECD}"/>
-              </a:ext>
-            </a:extLst>
-          </p:cNvPr>
-          <p:cNvPicPr>
-            <a:picLocks noChangeAspect="1"/>
-          </p:cNvPicPr>
-          <p:nvPr/>
-        </p:nvPicPr>
-        <p:blipFill>
-          <a:blip r:embed="rId3">
-            <a:extLst>
-              <a:ext uri="{28A0092B-C50C-407E-A947-70E740481C1C}">
-                <a14:useLocalDpi xmlns:a14="http://schemas.microsoft.com/office/drawing/2010/main" val="0"/>
-              </a:ext>
-            </a:extLst>
-          </a:blip>
-          <a:stretch>
-            <a:fillRect/>
-          </a:stretch>
-        </p:blipFill>
-        <p:spPr>
-          <a:xfrm>
-            <a:off x="7852317" y="682170"/>
-            <a:ext cx="626015" cy="5493657"/>
-          </a:xfrm>
-          <a:prstGeom prst="rect">
-            <a:avLst/>
-          </a:prstGeom>
-        </p:spPr>
-      </p:pic>
-      <p:pic>
-        <p:nvPicPr>
-          <p:cNvPr id="16" name="Picture 15">
-            <a:extLst>
-              <a:ext uri="{FF2B5EF4-FFF2-40B4-BE49-F238E27FC236}">
-                <a16:creationId xmlns:a16="http://schemas.microsoft.com/office/drawing/2014/main" id="{A7296E37-1A49-48A7-AFB2-CA0EFE4AAFE8}"/>
-              </a:ext>
-            </a:extLst>
-          </p:cNvPr>
-          <p:cNvPicPr>
-            <a:picLocks noChangeAspect="1"/>
-          </p:cNvPicPr>
-          <p:nvPr/>
-        </p:nvPicPr>
-        <p:blipFill>
-          <a:blip r:embed="rId4">
-            <a:extLst>
-              <a:ext uri="{28A0092B-C50C-407E-A947-70E740481C1C}">
-                <a14:useLocalDpi xmlns:a14="http://schemas.microsoft.com/office/drawing/2010/main" val="0"/>
-              </a:ext>
-            </a:extLst>
-          </a:blip>
-          <a:stretch>
-            <a:fillRect/>
-          </a:stretch>
-        </p:blipFill>
-        <p:spPr>
-          <a:xfrm>
-            <a:off x="8892831" y="1787070"/>
-            <a:ext cx="585261" cy="954900"/>
-          </a:xfrm>
-          <a:prstGeom prst="rect">
-            <a:avLst/>
-          </a:prstGeom>
-        </p:spPr>
-      </p:pic>
-      <p:sp>
-        <p:nvSpPr>
           <p:cNvPr id="17" name="TextBox 16">
             <a:extLst>
               <a:ext uri="{FF2B5EF4-FFF2-40B4-BE49-F238E27FC236}">
@@ -4414,84 +4800,6 @@
             <a:r>
               <a:rPr lang="en-US" dirty="0"/>
               <a:t>Desktop View</a:t>
-            </a:r>
-            <a:endParaRPr lang="en-PH" dirty="0"/>
-          </a:p>
-        </p:txBody>
-      </p:sp>
-      <p:sp>
-        <p:nvSpPr>
-          <p:cNvPr id="18" name="TextBox 17">
-            <a:extLst>
-              <a:ext uri="{FF2B5EF4-FFF2-40B4-BE49-F238E27FC236}">
-                <a16:creationId xmlns:a16="http://schemas.microsoft.com/office/drawing/2014/main" id="{8A80ABE2-6E84-4CB0-A9CC-D106EDE6E1C7}"/>
-              </a:ext>
-            </a:extLst>
-          </p:cNvPr>
-          <p:cNvSpPr txBox="1"/>
-          <p:nvPr/>
-        </p:nvSpPr>
-        <p:spPr>
-          <a:xfrm>
-            <a:off x="7492575" y="219075"/>
-            <a:ext cx="1345497" cy="369332"/>
-          </a:xfrm>
-          <a:prstGeom prst="rect">
-            <a:avLst/>
-          </a:prstGeom>
-          <a:noFill/>
-        </p:spPr>
-        <p:txBody>
-          <a:bodyPr wrap="none" rtlCol="0">
-            <a:spAutoFit/>
-          </a:bodyPr>
-          <a:lstStyle/>
-          <a:p>
-            <a:r>
-              <a:rPr lang="en-US" dirty="0"/>
-              <a:t>Mobile View</a:t>
-            </a:r>
-            <a:endParaRPr lang="en-PH" dirty="0"/>
-          </a:p>
-        </p:txBody>
-      </p:sp>
-      <p:sp>
-        <p:nvSpPr>
-          <p:cNvPr id="19" name="TextBox 18">
-            <a:extLst>
-              <a:ext uri="{FF2B5EF4-FFF2-40B4-BE49-F238E27FC236}">
-                <a16:creationId xmlns:a16="http://schemas.microsoft.com/office/drawing/2014/main" id="{4A894DDE-C68D-41F0-AC8B-5CD896BCC41F}"/>
-              </a:ext>
-            </a:extLst>
-          </p:cNvPr>
-          <p:cNvSpPr txBox="1"/>
-          <p:nvPr/>
-        </p:nvSpPr>
-        <p:spPr>
-          <a:xfrm>
-            <a:off x="9571399" y="2008554"/>
-            <a:ext cx="1345497" cy="646331"/>
-          </a:xfrm>
-          <a:prstGeom prst="rect">
-            <a:avLst/>
-          </a:prstGeom>
-          <a:noFill/>
-        </p:spPr>
-        <p:txBody>
-          <a:bodyPr wrap="none" rtlCol="0">
-            <a:spAutoFit/>
-          </a:bodyPr>
-          <a:lstStyle/>
-          <a:p>
-            <a:r>
-              <a:rPr lang="en-US" dirty="0"/>
-              <a:t>Mobile View</a:t>
-            </a:r>
-          </a:p>
-          <a:p>
-            <a:r>
-              <a:rPr lang="en-US" dirty="0"/>
-              <a:t>- Dropdown</a:t>
             </a:r>
             <a:endParaRPr lang="en-PH" dirty="0"/>
           </a:p>
@@ -4512,7 +4820,7 @@
           <p:nvPr/>
         </p:nvPicPr>
         <p:blipFill>
-          <a:blip r:embed="rId5">
+          <a:blip r:embed="rId2">
             <a:extLst>
               <a:ext uri="{28A0092B-C50C-407E-A947-70E740481C1C}">
                 <a14:useLocalDpi xmlns:a14="http://schemas.microsoft.com/office/drawing/2010/main" val="0"/>
@@ -4555,6 +4863,76 @@
           </a:sp3d>
         </p:spPr>
       </p:pic>
+      <p:pic>
+        <p:nvPicPr>
+          <p:cNvPr id="5" name="Picture 4">
+            <a:extLst>
+              <a:ext uri="{FF2B5EF4-FFF2-40B4-BE49-F238E27FC236}">
+                <a16:creationId xmlns:a16="http://schemas.microsoft.com/office/drawing/2014/main" id="{7EDD5738-6C31-4636-A2B8-82B2E6AAC755}"/>
+              </a:ext>
+            </a:extLst>
+          </p:cNvPr>
+          <p:cNvPicPr>
+            <a:picLocks noChangeAspect="1"/>
+          </p:cNvPicPr>
+          <p:nvPr/>
+        </p:nvPicPr>
+        <p:blipFill rotWithShape="1">
+          <a:blip r:embed="rId3">
+            <a:extLst>
+              <a:ext uri="{28A0092B-C50C-407E-A947-70E740481C1C}">
+                <a14:useLocalDpi xmlns:a14="http://schemas.microsoft.com/office/drawing/2010/main" val="0"/>
+              </a:ext>
+            </a:extLst>
+          </a:blip>
+          <a:srcRect t="1" r="648" b="43377"/>
+          <a:stretch/>
+        </p:blipFill>
+        <p:spPr>
+          <a:xfrm>
+            <a:off x="3949583" y="789940"/>
+            <a:ext cx="2517358" cy="5131004"/>
+          </a:xfrm>
+          <a:prstGeom prst="rect">
+            <a:avLst/>
+          </a:prstGeom>
+        </p:spPr>
+      </p:pic>
+      <p:pic>
+        <p:nvPicPr>
+          <p:cNvPr id="7" name="Picture 6">
+            <a:extLst>
+              <a:ext uri="{FF2B5EF4-FFF2-40B4-BE49-F238E27FC236}">
+                <a16:creationId xmlns:a16="http://schemas.microsoft.com/office/drawing/2014/main" id="{4ED1BA2D-7073-47FB-B524-78EDCB70C47A}"/>
+              </a:ext>
+            </a:extLst>
+          </p:cNvPr>
+          <p:cNvPicPr>
+            <a:picLocks noChangeAspect="1"/>
+          </p:cNvPicPr>
+          <p:nvPr/>
+        </p:nvPicPr>
+        <p:blipFill rotWithShape="1">
+          <a:blip r:embed="rId3">
+            <a:extLst>
+              <a:ext uri="{28A0092B-C50C-407E-A947-70E740481C1C}">
+                <a14:useLocalDpi xmlns:a14="http://schemas.microsoft.com/office/drawing/2010/main" val="0"/>
+              </a:ext>
+            </a:extLst>
+          </a:blip>
+          <a:srcRect t="56997" r="-335"/>
+          <a:stretch/>
+        </p:blipFill>
+        <p:spPr>
+          <a:xfrm>
+            <a:off x="6807083" y="795619"/>
+            <a:ext cx="2517358" cy="3858677"/>
+          </a:xfrm>
+          <a:prstGeom prst="rect">
+            <a:avLst/>
+          </a:prstGeom>
+        </p:spPr>
+      </p:pic>
     </p:spTree>
     <p:extLst>
       <p:ext uri="{BB962C8B-B14F-4D97-AF65-F5344CB8AC3E}">
@@ -4590,7 +4968,7 @@
           <p:cNvPr id="2" name="Title 1">
             <a:extLst>
               <a:ext uri="{FF2B5EF4-FFF2-40B4-BE49-F238E27FC236}">
-                <a16:creationId xmlns:a16="http://schemas.microsoft.com/office/drawing/2014/main" id="{13113489-D17D-4E35-A610-FCF4E4B9E053}"/>
+                <a16:creationId xmlns:a16="http://schemas.microsoft.com/office/drawing/2014/main" id="{8C5DC353-0ABA-40C6-B087-E75CC652197D}"/>
               </a:ext>
             </a:extLst>
           </p:cNvPr>
@@ -4608,47 +4986,18 @@
           <a:p>
             <a:r>
               <a:rPr lang="en-US" dirty="0"/>
-              <a:t>Gallery Page</a:t>
+              <a:t>Donation Page</a:t>
             </a:r>
             <a:endParaRPr lang="en-PH" dirty="0"/>
           </a:p>
         </p:txBody>
       </p:sp>
-      <p:sp>
-        <p:nvSpPr>
-          <p:cNvPr id="4" name="Text Placeholder 3">
+      <p:pic>
+        <p:nvPicPr>
+          <p:cNvPr id="11" name="Picture 10">
             <a:extLst>
               <a:ext uri="{FF2B5EF4-FFF2-40B4-BE49-F238E27FC236}">
-                <a16:creationId xmlns:a16="http://schemas.microsoft.com/office/drawing/2014/main" id="{066B4007-1A58-4EDB-B42F-FF01A2B0A974}"/>
-              </a:ext>
-            </a:extLst>
-          </p:cNvPr>
-          <p:cNvSpPr>
-            <a:spLocks noGrp="1"/>
-          </p:cNvSpPr>
-          <p:nvPr>
-            <p:ph type="body" sz="half" idx="2"/>
-          </p:nvPr>
-        </p:nvSpPr>
-        <p:spPr/>
-        <p:txBody>
-          <a:bodyPr/>
-          <a:lstStyle/>
-          <a:p>
-            <a:r>
-              <a:rPr lang="en-US" dirty="0"/>
-              <a:t>Gallery Mobile and Desktop View</a:t>
-            </a:r>
-            <a:endParaRPr lang="en-PH" dirty="0"/>
-          </a:p>
-        </p:txBody>
-      </p:sp>
-      <p:pic>
-        <p:nvPicPr>
-          <p:cNvPr id="6" name="Picture 5">
-            <a:extLst>
-              <a:ext uri="{FF2B5EF4-FFF2-40B4-BE49-F238E27FC236}">
-                <a16:creationId xmlns:a16="http://schemas.microsoft.com/office/drawing/2014/main" id="{47306C10-7605-4D86-A2EF-CCC105F30E04}"/>
+                <a16:creationId xmlns:a16="http://schemas.microsoft.com/office/drawing/2014/main" id="{0E603B5F-FC12-423D-9869-1FFEB688633E}"/>
               </a:ext>
             </a:extLst>
           </p:cNvPr>
@@ -4671,152 +5020,8 @@
         </p:blipFill>
         <p:spPr>
           <a:xfrm>
-            <a:off x="3869134" y="1495890"/>
-            <a:ext cx="4860131" cy="3456093"/>
-          </a:xfrm>
-          <a:prstGeom prst="rect">
-            <a:avLst/>
-          </a:prstGeom>
-        </p:spPr>
-      </p:pic>
-      <p:pic>
-        <p:nvPicPr>
-          <p:cNvPr id="8" name="Picture 7">
-            <a:extLst>
-              <a:ext uri="{FF2B5EF4-FFF2-40B4-BE49-F238E27FC236}">
-                <a16:creationId xmlns:a16="http://schemas.microsoft.com/office/drawing/2014/main" id="{553AB55D-83F4-4D2D-837F-4B81EA8B0BFB}"/>
-              </a:ext>
-            </a:extLst>
-          </p:cNvPr>
-          <p:cNvPicPr>
-            <a:picLocks noChangeAspect="1"/>
-          </p:cNvPicPr>
-          <p:nvPr/>
-        </p:nvPicPr>
-        <p:blipFill>
-          <a:blip r:embed="rId3">
-            <a:extLst>
-              <a:ext uri="{28A0092B-C50C-407E-A947-70E740481C1C}">
-                <a14:useLocalDpi xmlns:a14="http://schemas.microsoft.com/office/drawing/2010/main" val="0"/>
-              </a:ext>
-            </a:extLst>
-          </a:blip>
-          <a:stretch>
-            <a:fillRect/>
-          </a:stretch>
-        </p:blipFill>
-        <p:spPr>
-          <a:xfrm>
-            <a:off x="9507727" y="684530"/>
-            <a:ext cx="1155905" cy="5488940"/>
-          </a:xfrm>
-          <a:prstGeom prst="rect">
-            <a:avLst/>
-          </a:prstGeom>
-        </p:spPr>
-      </p:pic>
-      <p:sp>
-        <p:nvSpPr>
-          <p:cNvPr id="9" name="TextBox 8">
-            <a:extLst>
-              <a:ext uri="{FF2B5EF4-FFF2-40B4-BE49-F238E27FC236}">
-                <a16:creationId xmlns:a16="http://schemas.microsoft.com/office/drawing/2014/main" id="{AF4BCA97-A541-444B-AE38-19843D502B8D}"/>
-              </a:ext>
-            </a:extLst>
-          </p:cNvPr>
-          <p:cNvSpPr txBox="1"/>
-          <p:nvPr/>
-        </p:nvSpPr>
-        <p:spPr>
-          <a:xfrm>
-            <a:off x="5554315" y="958334"/>
-            <a:ext cx="1489767" cy="369332"/>
-          </a:xfrm>
-          <a:prstGeom prst="rect">
-            <a:avLst/>
-          </a:prstGeom>
-          <a:noFill/>
-        </p:spPr>
-        <p:txBody>
-          <a:bodyPr wrap="none" rtlCol="0">
-            <a:spAutoFit/>
-          </a:bodyPr>
-          <a:lstStyle/>
-          <a:p>
-            <a:r>
-              <a:rPr lang="en-US" dirty="0"/>
-              <a:t>Desktop View</a:t>
-            </a:r>
-            <a:endParaRPr lang="en-PH" dirty="0"/>
-          </a:p>
-        </p:txBody>
-      </p:sp>
-      <p:sp>
-        <p:nvSpPr>
-          <p:cNvPr id="10" name="TextBox 9">
-            <a:extLst>
-              <a:ext uri="{FF2B5EF4-FFF2-40B4-BE49-F238E27FC236}">
-                <a16:creationId xmlns:a16="http://schemas.microsoft.com/office/drawing/2014/main" id="{50746566-5982-470F-A74B-74562F2A86B2}"/>
-              </a:ext>
-            </a:extLst>
-          </p:cNvPr>
-          <p:cNvSpPr txBox="1"/>
-          <p:nvPr/>
-        </p:nvSpPr>
-        <p:spPr>
-          <a:xfrm>
-            <a:off x="7984381" y="5804138"/>
-            <a:ext cx="1345497" cy="369332"/>
-          </a:xfrm>
-          <a:prstGeom prst="rect">
-            <a:avLst/>
-          </a:prstGeom>
-          <a:noFill/>
-        </p:spPr>
-        <p:txBody>
-          <a:bodyPr wrap="none" rtlCol="0">
-            <a:spAutoFit/>
-          </a:bodyPr>
-          <a:lstStyle/>
-          <a:p>
-            <a:r>
-              <a:rPr lang="en-US" dirty="0"/>
-              <a:t>Mobile View</a:t>
-            </a:r>
-            <a:endParaRPr lang="en-PH" dirty="0"/>
-          </a:p>
-        </p:txBody>
-      </p:sp>
-      <p:pic>
-        <p:nvPicPr>
-          <p:cNvPr id="11" name="Picture 10">
-            <a:extLst>
-              <a:ext uri="{FF2B5EF4-FFF2-40B4-BE49-F238E27FC236}">
-                <a16:creationId xmlns:a16="http://schemas.microsoft.com/office/drawing/2014/main" id="{3A04375A-C739-4626-8397-5F8428173BEA}"/>
-              </a:ext>
-            </a:extLst>
-          </p:cNvPr>
-          <p:cNvPicPr>
-            <a:picLocks noChangeAspect="1"/>
-          </p:cNvPicPr>
-          <p:nvPr/>
-        </p:nvPicPr>
-        <p:blipFill>
-          <a:blip r:embed="rId4">
-            <a:extLst>
-              <a:ext uri="{28A0092B-C50C-407E-A947-70E740481C1C}">
-                <a14:useLocalDpi xmlns:a14="http://schemas.microsoft.com/office/drawing/2010/main" val="0"/>
-              </a:ext>
-            </a:extLst>
-          </a:blip>
-          <a:stretch>
-            <a:fillRect/>
-          </a:stretch>
-        </p:blipFill>
-        <p:spPr>
-          <a:xfrm>
-            <a:off x="3869341" y="5642348"/>
-            <a:ext cx="693018" cy="692912"/>
+            <a:off x="10809732" y="5704448"/>
+            <a:ext cx="759968" cy="759851"/>
           </a:xfrm>
           <a:prstGeom prst="ellipse">
             <a:avLst/>
@@ -4845,10 +5050,46 @@
           </a:sp3d>
         </p:spPr>
       </p:pic>
+      <p:pic>
+        <p:nvPicPr>
+          <p:cNvPr id="12" name="Picture 11">
+            <a:extLst>
+              <a:ext uri="{FF2B5EF4-FFF2-40B4-BE49-F238E27FC236}">
+                <a16:creationId xmlns:a16="http://schemas.microsoft.com/office/drawing/2014/main" id="{0DA6CF07-B010-4FB2-A36D-49E822397C08}"/>
+              </a:ext>
+            </a:extLst>
+          </p:cNvPr>
+          <p:cNvPicPr>
+            <a:picLocks noChangeAspect="1"/>
+          </p:cNvPicPr>
+          <p:nvPr/>
+        </p:nvPicPr>
+        <p:blipFill>
+          <a:blip r:embed="rId3">
+            <a:extLst>
+              <a:ext uri="{28A0092B-C50C-407E-A947-70E740481C1C}">
+                <a14:useLocalDpi xmlns:a14="http://schemas.microsoft.com/office/drawing/2010/main" val="0"/>
+              </a:ext>
+            </a:extLst>
+          </a:blip>
+          <a:stretch>
+            <a:fillRect/>
+          </a:stretch>
+        </p:blipFill>
+        <p:spPr>
+          <a:xfrm>
+            <a:off x="4057847" y="1399275"/>
+            <a:ext cx="6051353" cy="4059449"/>
+          </a:xfrm>
+          <a:prstGeom prst="rect">
+            <a:avLst/>
+          </a:prstGeom>
+        </p:spPr>
+      </p:pic>
     </p:spTree>
     <p:extLst>
       <p:ext uri="{BB962C8B-B14F-4D97-AF65-F5344CB8AC3E}">
-        <p14:creationId xmlns:p14="http://schemas.microsoft.com/office/powerpoint/2010/main" val="3726079869"/>
+        <p14:creationId xmlns:p14="http://schemas.microsoft.com/office/powerpoint/2010/main" val="297064086"/>
       </p:ext>
     </p:extLst>
   </p:cSld>
@@ -4880,7 +5121,7 @@
           <p:cNvPr id="2" name="Title 1">
             <a:extLst>
               <a:ext uri="{FF2B5EF4-FFF2-40B4-BE49-F238E27FC236}">
-                <a16:creationId xmlns:a16="http://schemas.microsoft.com/office/drawing/2014/main" id="{8C5DC353-0ABA-40C6-B087-E75CC652197D}"/>
+                <a16:creationId xmlns:a16="http://schemas.microsoft.com/office/drawing/2014/main" id="{3707A6F8-CDB9-42E6-A5A6-3621FDE8254B}"/>
               </a:ext>
             </a:extLst>
           </p:cNvPr>
@@ -4891,43 +5132,19 @@
             <p:ph type="title"/>
           </p:nvPr>
         </p:nvSpPr>
-        <p:spPr/>
+        <p:spPr>
+          <a:xfrm>
+            <a:off x="243332" y="2932430"/>
+            <a:ext cx="2834640" cy="993140"/>
+          </a:xfrm>
+        </p:spPr>
         <p:txBody>
           <a:bodyPr/>
           <a:lstStyle/>
           <a:p>
             <a:r>
               <a:rPr lang="en-US" dirty="0"/>
-              <a:t>Donation Form</a:t>
-            </a:r>
-            <a:endParaRPr lang="en-PH" dirty="0"/>
-          </a:p>
-        </p:txBody>
-      </p:sp>
-      <p:sp>
-        <p:nvSpPr>
-          <p:cNvPr id="4" name="Text Placeholder 3">
-            <a:extLst>
-              <a:ext uri="{FF2B5EF4-FFF2-40B4-BE49-F238E27FC236}">
-                <a16:creationId xmlns:a16="http://schemas.microsoft.com/office/drawing/2014/main" id="{AE958CB3-F9C5-40D2-A4A7-E1446668D7DA}"/>
-              </a:ext>
-            </a:extLst>
-          </p:cNvPr>
-          <p:cNvSpPr>
-            <a:spLocks noGrp="1"/>
-          </p:cNvSpPr>
-          <p:nvPr>
-            <p:ph type="body" sz="half" idx="2"/>
-          </p:nvPr>
-        </p:nvSpPr>
-        <p:spPr/>
-        <p:txBody>
-          <a:bodyPr/>
-          <a:lstStyle/>
-          <a:p>
-            <a:r>
-              <a:rPr lang="en-US" dirty="0"/>
-              <a:t>Mobile and Desktop View</a:t>
+              <a:t>Message Us Page</a:t>
             </a:r>
             <a:endParaRPr lang="en-PH" dirty="0"/>
           </a:p>
@@ -4938,7 +5155,7 @@
           <p:cNvPr id="6" name="Picture 5">
             <a:extLst>
               <a:ext uri="{FF2B5EF4-FFF2-40B4-BE49-F238E27FC236}">
-                <a16:creationId xmlns:a16="http://schemas.microsoft.com/office/drawing/2014/main" id="{13FA722A-373C-4E41-94A4-1D2B6A9F748D}"/>
+                <a16:creationId xmlns:a16="http://schemas.microsoft.com/office/drawing/2014/main" id="{BAECF5E8-DCAD-462E-A686-D058D7CAC064}"/>
               </a:ext>
             </a:extLst>
           </p:cNvPr>
@@ -4961,184 +5178,23 @@
         </p:blipFill>
         <p:spPr>
           <a:xfrm>
-            <a:off x="3701495" y="1338438"/>
-            <a:ext cx="5520532" cy="3925711"/>
+            <a:off x="4242554" y="1088390"/>
+            <a:ext cx="6340078" cy="4508500"/>
           </a:xfrm>
           <a:prstGeom prst="rect">
             <a:avLst/>
           </a:prstGeom>
-        </p:spPr>
-      </p:pic>
-      <p:pic>
-        <p:nvPicPr>
-          <p:cNvPr id="8" name="Picture 7">
-            <a:extLst>
-              <a:ext uri="{FF2B5EF4-FFF2-40B4-BE49-F238E27FC236}">
-                <a16:creationId xmlns:a16="http://schemas.microsoft.com/office/drawing/2014/main" id="{5CDEDAF8-656F-44AA-8A63-357742810BE5}"/>
-              </a:ext>
-            </a:extLst>
-          </p:cNvPr>
-          <p:cNvPicPr>
-            <a:picLocks noChangeAspect="1"/>
-          </p:cNvPicPr>
-          <p:nvPr/>
-        </p:nvPicPr>
-        <p:blipFill>
-          <a:blip r:embed="rId3">
-            <a:extLst>
-              <a:ext uri="{28A0092B-C50C-407E-A947-70E740481C1C}">
-                <a14:useLocalDpi xmlns:a14="http://schemas.microsoft.com/office/drawing/2010/main" val="0"/>
-              </a:ext>
-            </a:extLst>
-          </a:blip>
-          <a:stretch>
-            <a:fillRect/>
-          </a:stretch>
-        </p:blipFill>
-        <p:spPr>
-          <a:xfrm>
-            <a:off x="9832850" y="707136"/>
-            <a:ext cx="1502756" cy="5347208"/>
-          </a:xfrm>
-          <a:prstGeom prst="rect">
-            <a:avLst/>
-          </a:prstGeom>
-        </p:spPr>
-      </p:pic>
-      <p:sp>
-        <p:nvSpPr>
-          <p:cNvPr id="9" name="TextBox 8">
-            <a:extLst>
-              <a:ext uri="{FF2B5EF4-FFF2-40B4-BE49-F238E27FC236}">
-                <a16:creationId xmlns:a16="http://schemas.microsoft.com/office/drawing/2014/main" id="{5299F237-4F91-4981-8079-8E697A56FFE8}"/>
-              </a:ext>
-            </a:extLst>
-          </p:cNvPr>
-          <p:cNvSpPr txBox="1"/>
-          <p:nvPr/>
-        </p:nvSpPr>
-        <p:spPr>
-          <a:xfrm>
-            <a:off x="4011974" y="862568"/>
-            <a:ext cx="1489767" cy="369332"/>
-          </a:xfrm>
-          <a:prstGeom prst="rect">
-            <a:avLst/>
-          </a:prstGeom>
-          <a:noFill/>
-        </p:spPr>
-        <p:txBody>
-          <a:bodyPr wrap="none" rtlCol="0">
-            <a:spAutoFit/>
-          </a:bodyPr>
-          <a:lstStyle/>
-          <a:p>
-            <a:r>
-              <a:rPr lang="en-US" dirty="0"/>
-              <a:t>Desktop View</a:t>
-            </a:r>
-            <a:endParaRPr lang="en-PH" dirty="0"/>
-          </a:p>
-        </p:txBody>
-      </p:sp>
-      <p:sp>
-        <p:nvSpPr>
-          <p:cNvPr id="10" name="TextBox 9">
-            <a:extLst>
-              <a:ext uri="{FF2B5EF4-FFF2-40B4-BE49-F238E27FC236}">
-                <a16:creationId xmlns:a16="http://schemas.microsoft.com/office/drawing/2014/main" id="{378E6B31-C0E7-45B1-BCAF-1271748EA76D}"/>
-              </a:ext>
-            </a:extLst>
-          </p:cNvPr>
-          <p:cNvSpPr txBox="1"/>
-          <p:nvPr/>
-        </p:nvSpPr>
-        <p:spPr>
-          <a:xfrm>
-            <a:off x="8428581" y="5685012"/>
-            <a:ext cx="1345497" cy="369332"/>
-          </a:xfrm>
-          <a:prstGeom prst="rect">
-            <a:avLst/>
-          </a:prstGeom>
-          <a:noFill/>
-        </p:spPr>
-        <p:txBody>
-          <a:bodyPr wrap="none" rtlCol="0">
-            <a:spAutoFit/>
-          </a:bodyPr>
-          <a:lstStyle/>
-          <a:p>
-            <a:r>
-              <a:rPr lang="en-US" dirty="0"/>
-              <a:t>Mobile View</a:t>
-            </a:r>
-            <a:endParaRPr lang="en-PH" dirty="0"/>
-          </a:p>
-        </p:txBody>
-      </p:sp>
-      <p:pic>
-        <p:nvPicPr>
-          <p:cNvPr id="11" name="Picture 10">
-            <a:extLst>
-              <a:ext uri="{FF2B5EF4-FFF2-40B4-BE49-F238E27FC236}">
-                <a16:creationId xmlns:a16="http://schemas.microsoft.com/office/drawing/2014/main" id="{0E603B5F-FC12-423D-9869-1FFEB688633E}"/>
-              </a:ext>
-            </a:extLst>
-          </p:cNvPr>
-          <p:cNvPicPr>
-            <a:picLocks noChangeAspect="1"/>
-          </p:cNvPicPr>
-          <p:nvPr/>
-        </p:nvPicPr>
-        <p:blipFill>
-          <a:blip r:embed="rId4">
-            <a:extLst>
-              <a:ext uri="{28A0092B-C50C-407E-A947-70E740481C1C}">
-                <a14:useLocalDpi xmlns:a14="http://schemas.microsoft.com/office/drawing/2010/main" val="0"/>
-              </a:ext>
-            </a:extLst>
-          </a:blip>
-          <a:stretch>
-            <a:fillRect/>
-          </a:stretch>
-        </p:blipFill>
-        <p:spPr>
-          <a:xfrm>
-            <a:off x="256032" y="5685012"/>
-            <a:ext cx="716374" cy="716264"/>
-          </a:xfrm>
-          <a:prstGeom prst="ellipse">
-            <a:avLst/>
-          </a:prstGeom>
-          <a:ln w="63500" cap="rnd">
-            <a:noFill/>
+          <a:ln>
+            <a:solidFill>
+              <a:schemeClr val="tx2"/>
+            </a:solidFill>
           </a:ln>
-          <a:effectLst>
-            <a:outerShdw blurRad="381000" dist="292100" dir="5400000" sx="-80000" sy="-18000" rotWithShape="0">
-              <a:srgbClr val="000000">
-                <a:alpha val="22000"/>
-              </a:srgbClr>
-            </a:outerShdw>
-          </a:effectLst>
-          <a:scene3d>
-            <a:camera prst="orthographicFront"/>
-            <a:lightRig rig="contrasting" dir="t">
-              <a:rot lat="0" lon="0" rev="3000000"/>
-            </a:lightRig>
-          </a:scene3d>
-          <a:sp3d contourW="7620">
-            <a:bevelT w="95250" h="31750"/>
-            <a:contourClr>
-              <a:srgbClr val="333333"/>
-            </a:contourClr>
-          </a:sp3d>
         </p:spPr>
       </p:pic>
     </p:spTree>
     <p:extLst>
       <p:ext uri="{BB962C8B-B14F-4D97-AF65-F5344CB8AC3E}">
-        <p14:creationId xmlns:p14="http://schemas.microsoft.com/office/powerpoint/2010/main" val="297064086"/>
+        <p14:creationId xmlns:p14="http://schemas.microsoft.com/office/powerpoint/2010/main" val="4187998929"/>
       </p:ext>
     </p:extLst>
   </p:cSld>
@@ -5165,12 +5221,41 @@
           <a:chExt cx="0" cy="0"/>
         </a:xfrm>
       </p:grpSpPr>
+      <p:sp>
+        <p:nvSpPr>
+          <p:cNvPr id="2" name="Title 1">
+            <a:extLst>
+              <a:ext uri="{FF2B5EF4-FFF2-40B4-BE49-F238E27FC236}">
+                <a16:creationId xmlns:a16="http://schemas.microsoft.com/office/drawing/2014/main" id="{CBFE5531-35DD-4B8A-A09B-BEA158478157}"/>
+              </a:ext>
+            </a:extLst>
+          </p:cNvPr>
+          <p:cNvSpPr>
+            <a:spLocks noGrp="1"/>
+          </p:cNvSpPr>
+          <p:nvPr>
+            <p:ph type="title"/>
+          </p:nvPr>
+        </p:nvSpPr>
+        <p:spPr/>
+        <p:txBody>
+          <a:bodyPr/>
+          <a:lstStyle/>
+          <a:p>
+            <a:r>
+              <a:rPr lang="en-US" dirty="0"/>
+              <a:t>Photos</a:t>
+            </a:r>
+            <a:endParaRPr lang="en-PH" dirty="0"/>
+          </a:p>
+        </p:txBody>
+      </p:sp>
       <p:pic>
         <p:nvPicPr>
-          <p:cNvPr id="3" name="Picture 2">
+          <p:cNvPr id="6" name="Picture 5">
             <a:extLst>
               <a:ext uri="{FF2B5EF4-FFF2-40B4-BE49-F238E27FC236}">
-                <a16:creationId xmlns:a16="http://schemas.microsoft.com/office/drawing/2014/main" id="{07B30B51-8B61-4544-AFE6-F23CF1FC7C3A}"/>
+                <a16:creationId xmlns:a16="http://schemas.microsoft.com/office/drawing/2014/main" id="{E423FF3D-6C55-428C-A721-561F84FA5D95}"/>
               </a:ext>
             </a:extLst>
           </p:cNvPr>
@@ -5193,171 +5278,23 @@
         </p:blipFill>
         <p:spPr>
           <a:xfrm>
-            <a:off x="2017159" y="535273"/>
-            <a:ext cx="9692241" cy="5787454"/>
-          </a:xfrm>
-          <a:prstGeom prst="rect">
-            <a:avLst/>
-          </a:prstGeom>
-        </p:spPr>
-      </p:pic>
-      <p:sp>
-        <p:nvSpPr>
-          <p:cNvPr id="4" name="Rectangle 3">
-            <a:extLst>
-              <a:ext uri="{FF2B5EF4-FFF2-40B4-BE49-F238E27FC236}">
-                <a16:creationId xmlns:a16="http://schemas.microsoft.com/office/drawing/2014/main" id="{0BBF0F5E-E4C9-42DF-87F1-44A77616CBA4}"/>
-              </a:ext>
-            </a:extLst>
-          </p:cNvPr>
-          <p:cNvSpPr/>
-          <p:nvPr/>
-        </p:nvSpPr>
-        <p:spPr>
-          <a:xfrm>
-            <a:off x="-1" y="0"/>
-            <a:ext cx="1496219" cy="6858000"/>
+            <a:off x="4086820" y="1091565"/>
+            <a:ext cx="6831211" cy="4857750"/>
           </a:xfrm>
           <a:prstGeom prst="rect">
             <a:avLst/>
           </a:prstGeom>
           <a:ln>
-            <a:noFill/>
+            <a:solidFill>
+              <a:schemeClr val="tx2"/>
+            </a:solidFill>
           </a:ln>
         </p:spPr>
-        <p:style>
-          <a:lnRef idx="2">
-            <a:schemeClr val="accent1">
-              <a:shade val="50000"/>
-            </a:schemeClr>
-          </a:lnRef>
-          <a:fillRef idx="1">
-            <a:schemeClr val="accent1"/>
-          </a:fillRef>
-          <a:effectRef idx="0">
-            <a:schemeClr val="accent1"/>
-          </a:effectRef>
-          <a:fontRef idx="minor">
-            <a:schemeClr val="lt1"/>
-          </a:fontRef>
-        </p:style>
-        <p:txBody>
-          <a:bodyPr rtlCol="0" anchor="ctr"/>
-          <a:lstStyle/>
-          <a:p>
-            <a:pPr algn="ctr"/>
-            <a:endParaRPr lang="en-PH"/>
-          </a:p>
-        </p:txBody>
-      </p:sp>
-      <p:sp>
-        <p:nvSpPr>
-          <p:cNvPr id="5" name="TextBox 4">
-            <a:extLst>
-              <a:ext uri="{FF2B5EF4-FFF2-40B4-BE49-F238E27FC236}">
-                <a16:creationId xmlns:a16="http://schemas.microsoft.com/office/drawing/2014/main" id="{817B24FD-3015-4D3C-8253-BF3934F7328C}"/>
-              </a:ext>
-            </a:extLst>
-          </p:cNvPr>
-          <p:cNvSpPr txBox="1"/>
-          <p:nvPr/>
-        </p:nvSpPr>
-        <p:spPr>
-          <a:xfrm>
-            <a:off x="194109" y="207059"/>
-            <a:ext cx="1107996" cy="5511800"/>
-          </a:xfrm>
-          <a:prstGeom prst="rect">
-            <a:avLst/>
-          </a:prstGeom>
-          <a:noFill/>
-        </p:spPr>
-        <p:txBody>
-          <a:bodyPr vert="vert270" wrap="square" rtlCol="0">
-            <a:spAutoFit/>
-          </a:bodyPr>
-          <a:lstStyle/>
-          <a:p>
-            <a:pPr algn="ctr"/>
-            <a:r>
-              <a:rPr lang="en-US" sz="6000" b="1" dirty="0">
-                <a:solidFill>
-                  <a:schemeClr val="bg1"/>
-                </a:solidFill>
-              </a:rPr>
-              <a:t>MOOD BOARD</a:t>
-            </a:r>
-            <a:endParaRPr lang="en-PH" sz="6000" b="1" dirty="0">
-              <a:solidFill>
-                <a:schemeClr val="bg1"/>
-              </a:solidFill>
-            </a:endParaRPr>
-          </a:p>
-        </p:txBody>
-      </p:sp>
-      <p:sp>
-        <p:nvSpPr>
-          <p:cNvPr id="6" name="TextBox 5">
-            <a:extLst>
-              <a:ext uri="{FF2B5EF4-FFF2-40B4-BE49-F238E27FC236}">
-                <a16:creationId xmlns:a16="http://schemas.microsoft.com/office/drawing/2014/main" id="{0C45BCC4-FF38-47A1-BEE2-20885A116753}"/>
-              </a:ext>
-            </a:extLst>
-          </p:cNvPr>
-          <p:cNvSpPr txBox="1"/>
-          <p:nvPr/>
-        </p:nvSpPr>
-        <p:spPr>
-          <a:xfrm>
-            <a:off x="-2" y="5925918"/>
-            <a:ext cx="1496219" cy="646331"/>
-          </a:xfrm>
-          <a:prstGeom prst="rect">
-            <a:avLst/>
-          </a:prstGeom>
-          <a:noFill/>
-        </p:spPr>
-        <p:txBody>
-          <a:bodyPr wrap="square" rtlCol="0">
-            <a:spAutoFit/>
-          </a:bodyPr>
-          <a:lstStyle/>
-          <a:p>
-            <a:pPr algn="ctr"/>
-            <a:r>
-              <a:rPr lang="en-US" dirty="0">
-                <a:solidFill>
-                  <a:schemeClr val="bg1"/>
-                </a:solidFill>
-                <a:latin typeface="Franklin Gothic Book" panose="020B0503020102020204" pitchFamily="34" charset="0"/>
-              </a:rPr>
-              <a:t>WEBSITE </a:t>
-            </a:r>
-          </a:p>
-          <a:p>
-            <a:pPr algn="ctr"/>
-            <a:r>
-              <a:rPr lang="en-US" dirty="0">
-                <a:solidFill>
-                  <a:schemeClr val="bg1"/>
-                </a:solidFill>
-                <a:latin typeface="Franklin Gothic Book" panose="020B0503020102020204" pitchFamily="34" charset="0"/>
-              </a:rPr>
-              <a:t>THEME</a:t>
-            </a:r>
-            <a:endParaRPr lang="en-PH" dirty="0">
-              <a:solidFill>
-                <a:schemeClr val="bg1"/>
-              </a:solidFill>
-              <a:latin typeface="Franklin Gothic Book" panose="020B0503020102020204" pitchFamily="34" charset="0"/>
-            </a:endParaRPr>
-          </a:p>
-        </p:txBody>
-      </p:sp>
+      </p:pic>
     </p:spTree>
     <p:extLst>
       <p:ext uri="{BB962C8B-B14F-4D97-AF65-F5344CB8AC3E}">
-        <p14:creationId xmlns:p14="http://schemas.microsoft.com/office/powerpoint/2010/main" val="3137594366"/>
+        <p14:creationId xmlns:p14="http://schemas.microsoft.com/office/powerpoint/2010/main" val="3976792259"/>
       </p:ext>
     </p:extLst>
   </p:cSld>

</xml_diff>